<commit_message>
Organized and added notes for future presenters
</commit_message>
<xml_diff>
--- a/SCC Team Dev.pptx
+++ b/SCC Team Dev.pptx
@@ -7,7 +7,7 @@
     <p:sldMasterId id="2147483674" r:id="rId3"/>
   </p:sldMasterIdLst>
   <p:notesMasterIdLst>
-    <p:notesMasterId r:id="rId24"/>
+    <p:notesMasterId r:id="rId28"/>
   </p:notesMasterIdLst>
   <p:sldIdLst>
     <p:sldId id="256" r:id="rId4"/>
@@ -24,12 +24,16 @@
     <p:sldId id="274" r:id="rId15"/>
     <p:sldId id="276" r:id="rId16"/>
     <p:sldId id="279" r:id="rId17"/>
-    <p:sldId id="278" r:id="rId18"/>
-    <p:sldId id="282" r:id="rId19"/>
+    <p:sldId id="291" r:id="rId18"/>
+    <p:sldId id="278" r:id="rId19"/>
     <p:sldId id="283" r:id="rId20"/>
-    <p:sldId id="277" r:id="rId21"/>
-    <p:sldId id="280" r:id="rId22"/>
-    <p:sldId id="281" r:id="rId23"/>
+    <p:sldId id="289" r:id="rId21"/>
+    <p:sldId id="287" r:id="rId22"/>
+    <p:sldId id="288" r:id="rId23"/>
+    <p:sldId id="277" r:id="rId24"/>
+    <p:sldId id="280" r:id="rId25"/>
+    <p:sldId id="290" r:id="rId26"/>
+    <p:sldId id="281" r:id="rId27"/>
   </p:sldIdLst>
   <p:sldSz cx="9144000" cy="6858000" type="screen4x3"/>
   <p:notesSz cx="6858000" cy="9144000"/>
@@ -7334,7 +7338,7 @@
     </p:spTree>
     <p:extLst>
       <p:ext uri="{BB962C8B-B14F-4D97-AF65-F5344CB8AC3E}">
-        <p14:creationId xmlns:p14="http://schemas.microsoft.com/office/powerpoint/2010/main" xmlns="" val="383449499"/>
+        <p14:creationId xmlns="" xmlns:p14="http://schemas.microsoft.com/office/powerpoint/2010/main" val="383449499"/>
       </p:ext>
     </p:extLst>
   </p:cSld>
@@ -7448,7 +7452,7 @@
     </p:spTree>
     <p:extLst>
       <p:ext uri="{BB962C8B-B14F-4D97-AF65-F5344CB8AC3E}">
-        <p14:creationId xmlns="" xmlns:p14="http://schemas.microsoft.com/office/powerpoint/2010/main" val="703433207"/>
+        <p14:creationId xmlns:p14="http://schemas.microsoft.com/office/powerpoint/2010/main" xmlns="" val="703433207"/>
       </p:ext>
     </p:extLst>
   </p:cSld>
@@ -7627,7 +7631,7 @@
     </p:spTree>
     <p:extLst>
       <p:ext uri="{BB962C8B-B14F-4D97-AF65-F5344CB8AC3E}">
-        <p14:creationId xmlns="" xmlns:p14="http://schemas.microsoft.com/office/powerpoint/2010/main" val="3089371184"/>
+        <p14:creationId xmlns:p14="http://schemas.microsoft.com/office/powerpoint/2010/main" xmlns="" val="3089371184"/>
       </p:ext>
     </p:extLst>
   </p:cSld>
@@ -8005,7 +8009,7 @@
     </p:spTree>
     <p:extLst>
       <p:ext uri="{BB962C8B-B14F-4D97-AF65-F5344CB8AC3E}">
-        <p14:creationId xmlns:p14="http://schemas.microsoft.com/office/powerpoint/2010/main" xmlns="" val="1398796852"/>
+        <p14:creationId xmlns="" xmlns:p14="http://schemas.microsoft.com/office/powerpoint/2010/main" val="1398796852"/>
       </p:ext>
     </p:extLst>
   </p:cSld>
@@ -8112,6 +8116,111 @@
 </p:notes>
 </file>
 
+<file path=ppt/notesSlides/notesSlide7.xml><?xml version="1.0" encoding="utf-8"?>
+<p:notes xmlns:a="http://schemas.openxmlformats.org/drawingml/2006/main" xmlns:r="http://schemas.openxmlformats.org/officeDocument/2006/relationships" xmlns:p="http://schemas.openxmlformats.org/presentationml/2006/main">
+  <p:cSld>
+    <p:spTree>
+      <p:nvGrpSpPr>
+        <p:cNvPr id="1" name=""/>
+        <p:cNvGrpSpPr/>
+        <p:nvPr/>
+      </p:nvGrpSpPr>
+      <p:grpSpPr>
+        <a:xfrm>
+          <a:off x="0" y="0"/>
+          <a:ext cx="0" cy="0"/>
+          <a:chOff x="0" y="0"/>
+          <a:chExt cx="0" cy="0"/>
+        </a:xfrm>
+      </p:grpSpPr>
+      <p:sp>
+        <p:nvSpPr>
+          <p:cNvPr id="2" name="Slide Image Placeholder 1"/>
+          <p:cNvSpPr>
+            <a:spLocks noGrp="1" noRot="1" noChangeAspect="1"/>
+          </p:cNvSpPr>
+          <p:nvPr>
+            <p:ph type="sldImg"/>
+          </p:nvPr>
+        </p:nvSpPr>
+        <p:spPr/>
+      </p:sp>
+      <p:sp>
+        <p:nvSpPr>
+          <p:cNvPr id="3" name="Notes Placeholder 2"/>
+          <p:cNvSpPr>
+            <a:spLocks noGrp="1"/>
+          </p:cNvSpPr>
+          <p:nvPr>
+            <p:ph type="body" idx="1"/>
+          </p:nvPr>
+        </p:nvSpPr>
+        <p:spPr/>
+        <p:txBody>
+          <a:bodyPr>
+            <a:normAutofit/>
+          </a:bodyPr>
+          <a:lstStyle/>
+          <a:p>
+            <a:pPr marL="0" marR="0" indent="0" algn="l" defTabSz="914400" rtl="0" eaLnBrk="1" fontAlgn="auto" latinLnBrk="0" hangingPunct="1">
+              <a:lnSpc>
+                <a:spcPct val="100000"/>
+              </a:lnSpc>
+              <a:spcBef>
+                <a:spcPts val="0"/>
+              </a:spcBef>
+              <a:spcAft>
+                <a:spcPts val="0"/>
+              </a:spcAft>
+              <a:buClrTx/>
+              <a:buSzTx/>
+              <a:buFontTx/>
+              <a:buNone/>
+              <a:tabLst/>
+              <a:defRPr/>
+            </a:pPr>
+            <a:r>
+              <a:rPr lang="en-US" dirty="0" smtClean="0"/>
+              <a:t>http://git-scm.com/book/en/Distributed-Git-Distributed-Workflows</a:t>
+            </a:r>
+          </a:p>
+          <a:p>
+            <a:endParaRPr lang="en-US" dirty="0"/>
+          </a:p>
+        </p:txBody>
+      </p:sp>
+      <p:sp>
+        <p:nvSpPr>
+          <p:cNvPr id="4" name="Slide Number Placeholder 3"/>
+          <p:cNvSpPr>
+            <a:spLocks noGrp="1"/>
+          </p:cNvSpPr>
+          <p:nvPr>
+            <p:ph type="sldNum" sz="quarter" idx="10"/>
+          </p:nvPr>
+        </p:nvSpPr>
+        <p:spPr/>
+        <p:txBody>
+          <a:bodyPr/>
+          <a:lstStyle/>
+          <a:p>
+            <a:fld id="{9C438BA9-74D9-456F-930A-1E3580DACED0}" type="slidenum">
+              <a:rPr lang="en-US" smtClean="0"/>
+              <a:pPr/>
+              <a:t>17</a:t>
+            </a:fld>
+            <a:endParaRPr lang="en-US"/>
+          </a:p>
+        </p:txBody>
+      </p:sp>
+    </p:spTree>
+  </p:cSld>
+  <p:clrMapOvr>
+    <a:masterClrMapping/>
+  </p:clrMapOvr>
+</p:notes>
+</file>
+
 <file path=ppt/slideLayouts/slideLayout1.xml><?xml version="1.0" encoding="utf-8"?>
 <p:sldLayout xmlns:a="http://schemas.openxmlformats.org/drawingml/2006/main" xmlns:r="http://schemas.openxmlformats.org/officeDocument/2006/relationships" xmlns:p="http://schemas.openxmlformats.org/presentationml/2006/main" showMasterSp="0" preserve="1">
   <p:cSld name="Intro Slide">
@@ -8141,7 +8250,7 @@
           <a:blip r:embed="rId2" cstate="print">
             <a:extLst>
               <a:ext uri="{28A0092B-C50C-407E-A947-70E740481C1C}">
-                <a14:useLocalDpi xmlns:a14="http://schemas.microsoft.com/office/drawing/2010/main" xmlns="" val="0"/>
+                <a14:useLocalDpi xmlns="" xmlns:a14="http://schemas.microsoft.com/office/drawing/2010/main" val="0"/>
               </a:ext>
             </a:extLst>
           </a:blip>
@@ -8200,7 +8309,7 @@
     </p:spTree>
     <p:extLst>
       <p:ext uri="{BB962C8B-B14F-4D97-AF65-F5344CB8AC3E}">
-        <p14:creationId xmlns:p14="http://schemas.microsoft.com/office/powerpoint/2010/main" xmlns="" val="963566627"/>
+        <p14:creationId xmlns="" xmlns:p14="http://schemas.microsoft.com/office/powerpoint/2010/main" val="963566627"/>
       </p:ext>
     </p:extLst>
   </p:cSld>
@@ -8340,7 +8449,7 @@
     </p:spTree>
     <p:extLst>
       <p:ext uri="{BB962C8B-B14F-4D97-AF65-F5344CB8AC3E}">
-        <p14:creationId xmlns:p14="http://schemas.microsoft.com/office/powerpoint/2010/main" xmlns="" val="450312964"/>
+        <p14:creationId xmlns="" xmlns:p14="http://schemas.microsoft.com/office/powerpoint/2010/main" val="450312964"/>
       </p:ext>
     </p:extLst>
   </p:cSld>
@@ -8595,7 +8704,7 @@
     </p:spTree>
     <p:extLst>
       <p:ext uri="{BB962C8B-B14F-4D97-AF65-F5344CB8AC3E}">
-        <p14:creationId xmlns:p14="http://schemas.microsoft.com/office/powerpoint/2010/main" xmlns="" val="394559932"/>
+        <p14:creationId xmlns="" xmlns:p14="http://schemas.microsoft.com/office/powerpoint/2010/main" val="394559932"/>
       </p:ext>
     </p:extLst>
   </p:cSld>
@@ -8660,7 +8769,7 @@
     </p:spTree>
     <p:extLst>
       <p:ext uri="{BB962C8B-B14F-4D97-AF65-F5344CB8AC3E}">
-        <p14:creationId xmlns:p14="http://schemas.microsoft.com/office/powerpoint/2010/main" xmlns="" val="2249973708"/>
+        <p14:creationId xmlns="" xmlns:p14="http://schemas.microsoft.com/office/powerpoint/2010/main" val="2249973708"/>
       </p:ext>
     </p:extLst>
   </p:cSld>
@@ -8752,7 +8861,7 @@
     </p:spTree>
     <p:extLst>
       <p:ext uri="{BB962C8B-B14F-4D97-AF65-F5344CB8AC3E}">
-        <p14:creationId xmlns:p14="http://schemas.microsoft.com/office/powerpoint/2010/main" xmlns="" val="1172057952"/>
+        <p14:creationId xmlns="" xmlns:p14="http://schemas.microsoft.com/office/powerpoint/2010/main" val="1172057952"/>
       </p:ext>
     </p:extLst>
   </p:cSld>
@@ -8798,7 +8907,7 @@
           <a:blip r:embed="rId2" cstate="print">
             <a:extLst>
               <a:ext uri="{28A0092B-C50C-407E-A947-70E740481C1C}">
-                <a14:useLocalDpi xmlns:a14="http://schemas.microsoft.com/office/drawing/2010/main" xmlns="" val="0"/>
+                <a14:useLocalDpi xmlns="" xmlns:a14="http://schemas.microsoft.com/office/drawing/2010/main" val="0"/>
               </a:ext>
             </a:extLst>
           </a:blip>
@@ -8889,7 +8998,7 @@
     </p:spTree>
     <p:extLst>
       <p:ext uri="{BB962C8B-B14F-4D97-AF65-F5344CB8AC3E}">
-        <p14:creationId xmlns:p14="http://schemas.microsoft.com/office/powerpoint/2010/main" xmlns="" val="2609444701"/>
+        <p14:creationId xmlns="" xmlns:p14="http://schemas.microsoft.com/office/powerpoint/2010/main" val="2609444701"/>
       </p:ext>
     </p:extLst>
   </p:cSld>
@@ -8935,7 +9044,7 @@
           <a:blip r:embed="rId2" cstate="print">
             <a:extLst>
               <a:ext uri="{28A0092B-C50C-407E-A947-70E740481C1C}">
-                <a14:useLocalDpi xmlns:a14="http://schemas.microsoft.com/office/drawing/2010/main" xmlns="" val="0"/>
+                <a14:useLocalDpi xmlns="" xmlns:a14="http://schemas.microsoft.com/office/drawing/2010/main" val="0"/>
               </a:ext>
             </a:extLst>
           </a:blip>
@@ -9164,7 +9273,7 @@
     </p:spTree>
     <p:extLst>
       <p:ext uri="{BB962C8B-B14F-4D97-AF65-F5344CB8AC3E}">
-        <p14:creationId xmlns:p14="http://schemas.microsoft.com/office/powerpoint/2010/main" xmlns="" val="3105942657"/>
+        <p14:creationId xmlns="" xmlns:p14="http://schemas.microsoft.com/office/powerpoint/2010/main" val="3105942657"/>
       </p:ext>
     </p:extLst>
   </p:cSld>
@@ -9294,7 +9403,7 @@
     </p:spTree>
     <p:extLst>
       <p:ext uri="{BB962C8B-B14F-4D97-AF65-F5344CB8AC3E}">
-        <p14:creationId xmlns:p14="http://schemas.microsoft.com/office/powerpoint/2010/main" xmlns="" val="1591873819"/>
+        <p14:creationId xmlns="" xmlns:p14="http://schemas.microsoft.com/office/powerpoint/2010/main" val="1591873819"/>
       </p:ext>
     </p:extLst>
   </p:cSld>
@@ -9549,7 +9658,7 @@
     </p:spTree>
     <p:extLst>
       <p:ext uri="{BB962C8B-B14F-4D97-AF65-F5344CB8AC3E}">
-        <p14:creationId xmlns:p14="http://schemas.microsoft.com/office/powerpoint/2010/main" xmlns="" val="2768965281"/>
+        <p14:creationId xmlns="" xmlns:p14="http://schemas.microsoft.com/office/powerpoint/2010/main" val="2768965281"/>
       </p:ext>
     </p:extLst>
   </p:cSld>
@@ -9609,7 +9718,7 @@
     </p:spTree>
     <p:extLst>
       <p:ext uri="{BB962C8B-B14F-4D97-AF65-F5344CB8AC3E}">
-        <p14:creationId xmlns:p14="http://schemas.microsoft.com/office/powerpoint/2010/main" xmlns="" val="418747981"/>
+        <p14:creationId xmlns="" xmlns:p14="http://schemas.microsoft.com/office/powerpoint/2010/main" val="418747981"/>
       </p:ext>
     </p:extLst>
   </p:cSld>
@@ -9701,7 +9810,7 @@
     </p:spTree>
     <p:extLst>
       <p:ext uri="{BB962C8B-B14F-4D97-AF65-F5344CB8AC3E}">
-        <p14:creationId xmlns:p14="http://schemas.microsoft.com/office/powerpoint/2010/main" xmlns="" val="3105127185"/>
+        <p14:creationId xmlns="" xmlns:p14="http://schemas.microsoft.com/office/powerpoint/2010/main" val="3105127185"/>
       </p:ext>
     </p:extLst>
   </p:cSld>
@@ -9747,7 +9856,7 @@
           <a:blip r:embed="rId2" cstate="print">
             <a:extLst>
               <a:ext uri="{28A0092B-C50C-407E-A947-70E740481C1C}">
-                <a14:useLocalDpi xmlns:a14="http://schemas.microsoft.com/office/drawing/2010/main" xmlns="" val="0"/>
+                <a14:useLocalDpi xmlns="" xmlns:a14="http://schemas.microsoft.com/office/drawing/2010/main" val="0"/>
               </a:ext>
             </a:extLst>
           </a:blip>
@@ -9970,7 +10079,7 @@
     </p:spTree>
     <p:extLst>
       <p:ext uri="{BB962C8B-B14F-4D97-AF65-F5344CB8AC3E}">
-        <p14:creationId xmlns:p14="http://schemas.microsoft.com/office/powerpoint/2010/main" xmlns="" val="754216339"/>
+        <p14:creationId xmlns="" xmlns:p14="http://schemas.microsoft.com/office/powerpoint/2010/main" val="754216339"/>
       </p:ext>
     </p:extLst>
   </p:cSld>
@@ -10100,7 +10209,7 @@
     </p:spTree>
     <p:extLst>
       <p:ext uri="{BB962C8B-B14F-4D97-AF65-F5344CB8AC3E}">
-        <p14:creationId xmlns:p14="http://schemas.microsoft.com/office/powerpoint/2010/main" xmlns="" val="1359158008"/>
+        <p14:creationId xmlns="" xmlns:p14="http://schemas.microsoft.com/office/powerpoint/2010/main" val="1359158008"/>
       </p:ext>
     </p:extLst>
   </p:cSld>
@@ -10355,7 +10464,7 @@
     </p:spTree>
     <p:extLst>
       <p:ext uri="{BB962C8B-B14F-4D97-AF65-F5344CB8AC3E}">
-        <p14:creationId xmlns:p14="http://schemas.microsoft.com/office/powerpoint/2010/main" xmlns="" val="3008051926"/>
+        <p14:creationId xmlns="" xmlns:p14="http://schemas.microsoft.com/office/powerpoint/2010/main" val="3008051926"/>
       </p:ext>
     </p:extLst>
   </p:cSld>
@@ -10415,7 +10524,7 @@
     </p:spTree>
     <p:extLst>
       <p:ext uri="{BB962C8B-B14F-4D97-AF65-F5344CB8AC3E}">
-        <p14:creationId xmlns:p14="http://schemas.microsoft.com/office/powerpoint/2010/main" xmlns="" val="2315071875"/>
+        <p14:creationId xmlns="" xmlns:p14="http://schemas.microsoft.com/office/powerpoint/2010/main" val="2315071875"/>
       </p:ext>
     </p:extLst>
   </p:cSld>
@@ -10507,7 +10616,7 @@
     </p:spTree>
     <p:extLst>
       <p:ext uri="{BB962C8B-B14F-4D97-AF65-F5344CB8AC3E}">
-        <p14:creationId xmlns:p14="http://schemas.microsoft.com/office/powerpoint/2010/main" xmlns="" val="1814470786"/>
+        <p14:creationId xmlns="" xmlns:p14="http://schemas.microsoft.com/office/powerpoint/2010/main" val="1814470786"/>
       </p:ext>
     </p:extLst>
   </p:cSld>
@@ -10601,7 +10710,7 @@
           <a:blip r:embed="rId2" cstate="print">
             <a:extLst>
               <a:ext uri="{28A0092B-C50C-407E-A947-70E740481C1C}">
-                <a14:useLocalDpi xmlns:a14="http://schemas.microsoft.com/office/drawing/2010/main" xmlns="" val="0"/>
+                <a14:useLocalDpi xmlns="" xmlns:a14="http://schemas.microsoft.com/office/drawing/2010/main" val="0"/>
               </a:ext>
             </a:extLst>
           </a:blip>
@@ -10657,7 +10766,7 @@
     </p:spTree>
     <p:extLst>
       <p:ext uri="{BB962C8B-B14F-4D97-AF65-F5344CB8AC3E}">
-        <p14:creationId xmlns:p14="http://schemas.microsoft.com/office/powerpoint/2010/main" xmlns="" val="3738709069"/>
+        <p14:creationId xmlns="" xmlns:p14="http://schemas.microsoft.com/office/powerpoint/2010/main" val="3738709069"/>
       </p:ext>
     </p:extLst>
   </p:cSld>
@@ -10696,7 +10805,7 @@
           <a:blip r:embed="rId2" cstate="print">
             <a:extLst>
               <a:ext uri="{28A0092B-C50C-407E-A947-70E740481C1C}">
-                <a14:useLocalDpi xmlns:a14="http://schemas.microsoft.com/office/drawing/2010/main" xmlns="" val="0"/>
+                <a14:useLocalDpi xmlns="" xmlns:a14="http://schemas.microsoft.com/office/drawing/2010/main" val="0"/>
               </a:ext>
             </a:extLst>
           </a:blip>
@@ -10943,7 +11052,7 @@
     </p:spTree>
     <p:extLst>
       <p:ext uri="{BB962C8B-B14F-4D97-AF65-F5344CB8AC3E}">
-        <p14:creationId xmlns:p14="http://schemas.microsoft.com/office/powerpoint/2010/main" xmlns="" val="655524468"/>
+        <p14:creationId xmlns="" xmlns:p14="http://schemas.microsoft.com/office/powerpoint/2010/main" val="655524468"/>
       </p:ext>
     </p:extLst>
   </p:cSld>
@@ -10994,7 +11103,7 @@
           <a:blip r:embed="rId9" cstate="print">
             <a:extLst>
               <a:ext uri="{28A0092B-C50C-407E-A947-70E740481C1C}">
-                <a14:useLocalDpi xmlns:a14="http://schemas.microsoft.com/office/drawing/2010/main" xmlns="" val="0"/>
+                <a14:useLocalDpi xmlns="" xmlns:a14="http://schemas.microsoft.com/office/drawing/2010/main" val="0"/>
               </a:ext>
             </a:extLst>
           </a:blip>
@@ -11195,7 +11304,7 @@
     </p:spTree>
     <p:extLst>
       <p:ext uri="{BB962C8B-B14F-4D97-AF65-F5344CB8AC3E}">
-        <p14:creationId xmlns:p14="http://schemas.microsoft.com/office/powerpoint/2010/main" xmlns="" val="794604837"/>
+        <p14:creationId xmlns="" xmlns:p14="http://schemas.microsoft.com/office/powerpoint/2010/main" val="794604837"/>
       </p:ext>
     </p:extLst>
   </p:cSld>
@@ -11533,7 +11642,7 @@
           <a:blip r:embed="rId8" cstate="print">
             <a:extLst>
               <a:ext uri="{28A0092B-C50C-407E-A947-70E740481C1C}">
-                <a14:useLocalDpi xmlns:a14="http://schemas.microsoft.com/office/drawing/2010/main" xmlns="" val="0"/>
+                <a14:useLocalDpi xmlns="" xmlns:a14="http://schemas.microsoft.com/office/drawing/2010/main" val="0"/>
               </a:ext>
             </a:extLst>
           </a:blip>
@@ -11747,7 +11856,7 @@
     </p:spTree>
     <p:extLst>
       <p:ext uri="{BB962C8B-B14F-4D97-AF65-F5344CB8AC3E}">
-        <p14:creationId xmlns:p14="http://schemas.microsoft.com/office/powerpoint/2010/main" xmlns="" val="2562527116"/>
+        <p14:creationId xmlns="" xmlns:p14="http://schemas.microsoft.com/office/powerpoint/2010/main" val="2562527116"/>
       </p:ext>
     </p:extLst>
   </p:cSld>
@@ -12084,7 +12193,7 @@
           <a:blip r:embed="rId8" cstate="print">
             <a:extLst>
               <a:ext uri="{28A0092B-C50C-407E-A947-70E740481C1C}">
-                <a14:useLocalDpi xmlns:a14="http://schemas.microsoft.com/office/drawing/2010/main" xmlns="" val="0"/>
+                <a14:useLocalDpi xmlns="" xmlns:a14="http://schemas.microsoft.com/office/drawing/2010/main" val="0"/>
               </a:ext>
             </a:extLst>
           </a:blip>
@@ -12280,7 +12389,7 @@
     </p:spTree>
     <p:extLst>
       <p:ext uri="{BB962C8B-B14F-4D97-AF65-F5344CB8AC3E}">
-        <p14:creationId xmlns:p14="http://schemas.microsoft.com/office/powerpoint/2010/main" xmlns="" val="569510580"/>
+        <p14:creationId xmlns="" xmlns:p14="http://schemas.microsoft.com/office/powerpoint/2010/main" val="569510580"/>
       </p:ext>
     </p:extLst>
   </p:cSld>
@@ -12707,7 +12816,7 @@
             <p:ph sz="half" idx="1"/>
             <p:extLst>
               <p:ext uri="{D42A27DB-BD31-4B8C-83A1-F6EECF244321}">
-                <p14:modId xmlns:p14="http://schemas.microsoft.com/office/powerpoint/2010/main" xmlns="" val="4091153283"/>
+                <p14:modId xmlns="" xmlns:p14="http://schemas.microsoft.com/office/powerpoint/2010/main" val="4091153283"/>
               </p:ext>
             </p:extLst>
           </p:nvPr>
@@ -12732,7 +12841,7 @@
             <p:ph sz="half" idx="2"/>
             <p:extLst>
               <p:ext uri="{D42A27DB-BD31-4B8C-83A1-F6EECF244321}">
-                <p14:modId xmlns:p14="http://schemas.microsoft.com/office/powerpoint/2010/main" xmlns="" val="17827361"/>
+                <p14:modId xmlns="" xmlns:p14="http://schemas.microsoft.com/office/powerpoint/2010/main" val="17827361"/>
               </p:ext>
             </p:extLst>
           </p:nvPr>
@@ -12852,7 +12961,7 @@
     </p:spTree>
     <p:extLst>
       <p:ext uri="{BB962C8B-B14F-4D97-AF65-F5344CB8AC3E}">
-        <p14:creationId xmlns:p14="http://schemas.microsoft.com/office/powerpoint/2010/main" xmlns="" val="2236081562"/>
+        <p14:creationId xmlns="" xmlns:p14="http://schemas.microsoft.com/office/powerpoint/2010/main" val="2236081562"/>
       </p:ext>
     </p:extLst>
   </p:cSld>
@@ -13515,7 +13624,7 @@
     </p:spTree>
     <p:extLst>
       <p:ext uri="{BB962C8B-B14F-4D97-AF65-F5344CB8AC3E}">
-        <p14:creationId xmlns:p14="http://schemas.microsoft.com/office/powerpoint/2010/main" xmlns="" val="1856926533"/>
+        <p14:creationId xmlns="" xmlns:p14="http://schemas.microsoft.com/office/powerpoint/2010/main" val="1856926533"/>
       </p:ext>
     </p:extLst>
   </p:cSld>
@@ -13640,7 +13749,11 @@
           <a:p>
             <a:r>
               <a:rPr lang="en-US" dirty="0" smtClean="0"/>
-              <a:t>Organizing Your Project</a:t>
+              <a:t>Organizing Your </a:t>
+            </a:r>
+            <a:r>
+              <a:rPr lang="en-US" dirty="0" smtClean="0"/>
+              <a:t>Project Team</a:t>
             </a:r>
             <a:endParaRPr lang="en-US" dirty="0"/>
           </a:p>
@@ -13781,15 +13894,7 @@
           <a:p>
             <a:r>
               <a:rPr lang="en-US" dirty="0" smtClean="0"/>
-              <a:t>//Include recommendations for starting the organization of your Project </a:t>
-            </a:r>
-            <a:r>
-              <a:rPr lang="en-US" dirty="0" smtClean="0"/>
-              <a:t>E</a:t>
-            </a:r>
-            <a:r>
-              <a:rPr lang="en-US" dirty="0" smtClean="0"/>
-              <a:t>xplorer</a:t>
+              <a:t>//Include recommendations for starting the organization of your Project Explorer</a:t>
             </a:r>
             <a:endParaRPr lang="en-US" dirty="0"/>
           </a:p>
@@ -13844,7 +13949,100 @@
           <a:p>
             <a:r>
               <a:rPr lang="en-US" dirty="0" smtClean="0"/>
-              <a:t>Organizing Your Repository in SCC</a:t>
+              <a:t>What is _____?</a:t>
+            </a:r>
+            <a:endParaRPr lang="en-US" dirty="0"/>
+          </a:p>
+        </p:txBody>
+      </p:sp>
+      <p:sp>
+        <p:nvSpPr>
+          <p:cNvPr id="3" name="Content Placeholder 2"/>
+          <p:cNvSpPr>
+            <a:spLocks noGrp="1"/>
+          </p:cNvSpPr>
+          <p:nvPr>
+            <p:ph idx="1"/>
+          </p:nvPr>
+        </p:nvSpPr>
+        <p:spPr/>
+        <p:txBody>
+          <a:bodyPr/>
+          <a:lstStyle/>
+          <a:p>
+            <a:r>
+              <a:rPr lang="en-US" dirty="0" smtClean="0"/>
+              <a:t>//Discuss what the SCC tool is</a:t>
+            </a:r>
+          </a:p>
+          <a:p>
+            <a:r>
+              <a:rPr lang="en-US" dirty="0" smtClean="0"/>
+              <a:t>//Include benefits and drawbacks to this tool</a:t>
+            </a:r>
+          </a:p>
+          <a:p>
+            <a:r>
+              <a:rPr lang="en-US" dirty="0" smtClean="0"/>
+              <a:t>//Comment on the learning curve for this tool</a:t>
+            </a:r>
+            <a:endParaRPr lang="en-US" dirty="0"/>
+          </a:p>
+        </p:txBody>
+      </p:sp>
+    </p:spTree>
+  </p:cSld>
+  <p:clrMapOvr>
+    <a:masterClrMapping/>
+  </p:clrMapOvr>
+</p:sld>
+</file>
+
+<file path=ppt/slides/slide16.xml><?xml version="1.0" encoding="utf-8"?>
+<p:sld xmlns:a="http://schemas.openxmlformats.org/drawingml/2006/main" xmlns:r="http://schemas.openxmlformats.org/officeDocument/2006/relationships" xmlns:p="http://schemas.openxmlformats.org/presentationml/2006/main">
+  <p:cSld>
+    <p:spTree>
+      <p:nvGrpSpPr>
+        <p:cNvPr id="1" name=""/>
+        <p:cNvGrpSpPr/>
+        <p:nvPr/>
+      </p:nvGrpSpPr>
+      <p:grpSpPr>
+        <a:xfrm>
+          <a:off x="0" y="0"/>
+          <a:ext cx="0" cy="0"/>
+          <a:chOff x="0" y="0"/>
+          <a:chExt cx="0" cy="0"/>
+        </a:xfrm>
+      </p:grpSpPr>
+      <p:sp>
+        <p:nvSpPr>
+          <p:cNvPr id="2" name="Title 1"/>
+          <p:cNvSpPr>
+            <a:spLocks noGrp="1"/>
+          </p:cNvSpPr>
+          <p:nvPr>
+            <p:ph type="title"/>
+          </p:nvPr>
+        </p:nvSpPr>
+        <p:spPr/>
+        <p:txBody>
+          <a:bodyPr>
+            <a:normAutofit fontScale="90000"/>
+          </a:bodyPr>
+          <a:lstStyle/>
+          <a:p>
+            <a:r>
+              <a:rPr lang="en-US" dirty="0" smtClean="0"/>
+              <a:t>Organizing </a:t>
+            </a:r>
+            <a:r>
+              <a:rPr lang="en-US" dirty="0" smtClean="0"/>
+              <a:t>Your </a:t>
+            </a:r>
+            <a:r>
+              <a:rPr lang="en-US" dirty="0" smtClean="0"/>
+              <a:t>Repository – General Recommendation</a:t>
             </a:r>
             <a:endParaRPr lang="en-US" dirty="0"/>
           </a:p>
@@ -14640,116 +14838,6 @@
 </p:sld>
 </file>
 
-<file path=ppt/slides/slide16.xml><?xml version="1.0" encoding="utf-8"?>
-<p:sld xmlns:a="http://schemas.openxmlformats.org/drawingml/2006/main" xmlns:r="http://schemas.openxmlformats.org/officeDocument/2006/relationships" xmlns:p="http://schemas.openxmlformats.org/presentationml/2006/main">
-  <p:cSld>
-    <p:spTree>
-      <p:nvGrpSpPr>
-        <p:cNvPr id="1" name=""/>
-        <p:cNvGrpSpPr/>
-        <p:nvPr/>
-      </p:nvGrpSpPr>
-      <p:grpSpPr>
-        <a:xfrm>
-          <a:off x="0" y="0"/>
-          <a:ext cx="0" cy="0"/>
-          <a:chOff x="0" y="0"/>
-          <a:chExt cx="0" cy="0"/>
-        </a:xfrm>
-      </p:grpSpPr>
-      <p:sp>
-        <p:nvSpPr>
-          <p:cNvPr id="2" name="Title 1"/>
-          <p:cNvSpPr>
-            <a:spLocks noGrp="1"/>
-          </p:cNvSpPr>
-          <p:nvPr>
-            <p:ph type="title"/>
-          </p:nvPr>
-        </p:nvSpPr>
-        <p:spPr/>
-        <p:txBody>
-          <a:bodyPr/>
-          <a:lstStyle/>
-          <a:p>
-            <a:r>
-              <a:rPr lang="en-US" dirty="0" smtClean="0"/>
-              <a:t>Workflow recommendations</a:t>
-            </a:r>
-            <a:endParaRPr lang="en-US" dirty="0"/>
-          </a:p>
-        </p:txBody>
-      </p:sp>
-      <p:sp>
-        <p:nvSpPr>
-          <p:cNvPr id="3" name="Content Placeholder 2"/>
-          <p:cNvSpPr>
-            <a:spLocks noGrp="1"/>
-          </p:cNvSpPr>
-          <p:nvPr>
-            <p:ph idx="1"/>
-          </p:nvPr>
-        </p:nvSpPr>
-        <p:spPr/>
-        <p:txBody>
-          <a:bodyPr/>
-          <a:lstStyle/>
-          <a:p>
-            <a:r>
-              <a:rPr lang="en-US" dirty="0" smtClean="0"/>
-              <a:t>http://git-scm.com/book/en/Distributed-Git-Distributed-Workflows</a:t>
-            </a:r>
-            <a:endParaRPr lang="en-US" dirty="0"/>
-          </a:p>
-        </p:txBody>
-      </p:sp>
-      <p:pic>
-        <p:nvPicPr>
-          <p:cNvPr id="1026" name="Picture 2"/>
-          <p:cNvPicPr>
-            <a:picLocks noChangeAspect="1" noChangeArrowheads="1"/>
-          </p:cNvPicPr>
-          <p:nvPr/>
-        </p:nvPicPr>
-        <p:blipFill>
-          <a:blip r:embed="rId2" cstate="print"/>
-          <a:srcRect/>
-          <a:stretch>
-            <a:fillRect/>
-          </a:stretch>
-        </p:blipFill>
-        <p:spPr bwMode="auto">
-          <a:xfrm>
-            <a:off x="1847850" y="2181225"/>
-            <a:ext cx="5448300" cy="2495550"/>
-          </a:xfrm>
-          <a:prstGeom prst="rect">
-            <a:avLst/>
-          </a:prstGeom>
-          <a:noFill/>
-          <a:ln w="9525">
-            <a:noFill/>
-            <a:miter lim="800000"/>
-            <a:headEnd/>
-            <a:tailEnd/>
-          </a:ln>
-        </p:spPr>
-      </p:pic>
-    </p:spTree>
-  </p:cSld>
-  <p:clrMapOvr>
-    <a:masterClrMapping/>
-  </p:clrMapOvr>
-  <p:timing>
-    <p:tnLst>
-      <p:par>
-        <p:cTn id="1" dur="indefinite" restart="never" nodeType="tmRoot"/>
-      </p:par>
-    </p:tnLst>
-  </p:timing>
-</p:sld>
-</file>
-
 <file path=ppt/slides/slide17.xml><?xml version="1.0" encoding="utf-8"?>
 <p:sld xmlns:a="http://schemas.openxmlformats.org/drawingml/2006/main" xmlns:r="http://schemas.openxmlformats.org/officeDocument/2006/relationships" xmlns:p="http://schemas.openxmlformats.org/presentationml/2006/main">
   <p:cSld>
@@ -14784,7 +14872,11 @@
           <a:p>
             <a:r>
               <a:rPr lang="en-US" dirty="0" smtClean="0"/>
-              <a:t>Workflow Recommendations</a:t>
+              <a:t>General Workflow </a:t>
+            </a:r>
+            <a:r>
+              <a:rPr lang="en-US" dirty="0" smtClean="0"/>
+              <a:t>Recommendations</a:t>
             </a:r>
             <a:endParaRPr lang="en-US" dirty="0"/>
           </a:p>
@@ -14813,7 +14905,7 @@
             <p:nvPr/>
           </p:nvPicPr>
           <p:blipFill>
-            <a:blip r:embed="rId2" cstate="print"/>
+            <a:blip r:embed="rId3" cstate="print"/>
             <a:srcRect b="17742"/>
             <a:stretch>
               <a:fillRect/>
@@ -14883,7 +14975,7 @@
             <p:nvPr/>
           </p:nvPicPr>
           <p:blipFill>
-            <a:blip r:embed="rId2" cstate="print"/>
+            <a:blip r:embed="rId3" cstate="print"/>
             <a:srcRect b="17742"/>
             <a:stretch>
               <a:fillRect/>
@@ -15022,7 +15114,7 @@
             <p:nvPr/>
           </p:nvPicPr>
           <p:blipFill>
-            <a:blip r:embed="rId2" cstate="print"/>
+            <a:blip r:embed="rId3" cstate="print"/>
             <a:srcRect b="17742"/>
             <a:stretch>
               <a:fillRect/>
@@ -15954,7 +16046,7 @@
           <a:p>
             <a:r>
               <a:rPr lang="en-US" dirty="0" smtClean="0"/>
-              <a:t>Tags in Source Code Control</a:t>
+              <a:t>Team Development Project Use Case #1</a:t>
             </a:r>
             <a:endParaRPr lang="en-US" dirty="0"/>
           </a:p>
@@ -15977,13 +16069,7 @@
           <a:p>
             <a:r>
               <a:rPr lang="en-US" dirty="0" smtClean="0"/>
-              <a:t>Tags allow you to record changes or modifications to your repository</a:t>
-            </a:r>
-          </a:p>
-          <a:p>
-            <a:r>
-              <a:rPr lang="en-US" dirty="0" smtClean="0"/>
-              <a:t>Tags can be useful for maintaining code for a previous version of LabVIEW</a:t>
+              <a:t>//Include a team development scenario and include a completed “Organizing Your Workflow” and “Workflow Recommendations” slides</a:t>
             </a:r>
             <a:endParaRPr lang="en-US" dirty="0"/>
           </a:p>
@@ -15994,13 +16080,6 @@
   <p:clrMapOvr>
     <a:masterClrMapping/>
   </p:clrMapOvr>
-  <p:timing>
-    <p:tnLst>
-      <p:par>
-        <p:cTn id="1" dur="indefinite" restart="never" nodeType="tmRoot"/>
-      </p:par>
-    </p:tnLst>
-  </p:timing>
 </p:sld>
 </file>
 
@@ -16038,7 +16117,7 @@
           <a:p>
             <a:r>
               <a:rPr lang="en-US" dirty="0" smtClean="0"/>
-              <a:t>Files to include and exclude in SCC</a:t>
+              <a:t>Team Development Project Use Case #2</a:t>
             </a:r>
             <a:endParaRPr lang="en-US" dirty="0"/>
           </a:p>
@@ -16061,7 +16140,7 @@
           <a:p>
             <a:r>
               <a:rPr lang="en-US" dirty="0" smtClean="0"/>
-              <a:t>//NOTE: This may or may not be helpful since there are any opinions about this. Added as a placeholder, but not sure how useful it would be.</a:t>
+              <a:t>//Include a team development scenario and include a completed “Organizing Your Workflow” and “Workflow Recommendations” slides</a:t>
             </a:r>
             <a:endParaRPr lang="en-US" dirty="0"/>
           </a:p>
@@ -16072,13 +16151,6 @@
   <p:clrMapOvr>
     <a:masterClrMapping/>
   </p:clrMapOvr>
-  <p:timing>
-    <p:tnLst>
-      <p:par>
-        <p:cTn id="1" dur="indefinite" restart="never" nodeType="tmRoot"/>
-      </p:par>
-    </p:tnLst>
-  </p:timing>
 </p:sld>
 </file>
 
@@ -16161,6 +16233,346 @@
 </file>
 
 <file path=ppt/slides/slide20.xml><?xml version="1.0" encoding="utf-8"?>
+<p:sld xmlns:a="http://schemas.openxmlformats.org/drawingml/2006/main" xmlns:r="http://schemas.openxmlformats.org/officeDocument/2006/relationships" xmlns:p="http://schemas.openxmlformats.org/presentationml/2006/main">
+  <p:cSld>
+    <p:spTree>
+      <p:nvGrpSpPr>
+        <p:cNvPr id="1" name=""/>
+        <p:cNvGrpSpPr/>
+        <p:nvPr/>
+      </p:nvGrpSpPr>
+      <p:grpSpPr>
+        <a:xfrm>
+          <a:off x="0" y="0"/>
+          <a:ext cx="0" cy="0"/>
+          <a:chOff x="0" y="0"/>
+          <a:chExt cx="0" cy="0"/>
+        </a:xfrm>
+      </p:grpSpPr>
+      <p:sp>
+        <p:nvSpPr>
+          <p:cNvPr id="2" name="Title 1"/>
+          <p:cNvSpPr>
+            <a:spLocks noGrp="1"/>
+          </p:cNvSpPr>
+          <p:nvPr>
+            <p:ph type="title"/>
+          </p:nvPr>
+        </p:nvSpPr>
+        <p:spPr/>
+        <p:txBody>
+          <a:bodyPr/>
+          <a:lstStyle/>
+          <a:p>
+            <a:r>
+              <a:rPr lang="en-US" dirty="0" smtClean="0"/>
+              <a:t>Team Development Project Use Case #3</a:t>
+            </a:r>
+            <a:endParaRPr lang="en-US" dirty="0"/>
+          </a:p>
+        </p:txBody>
+      </p:sp>
+      <p:sp>
+        <p:nvSpPr>
+          <p:cNvPr id="3" name="Content Placeholder 2"/>
+          <p:cNvSpPr>
+            <a:spLocks noGrp="1"/>
+          </p:cNvSpPr>
+          <p:nvPr>
+            <p:ph idx="1"/>
+          </p:nvPr>
+        </p:nvSpPr>
+        <p:spPr/>
+        <p:txBody>
+          <a:bodyPr/>
+          <a:lstStyle/>
+          <a:p>
+            <a:r>
+              <a:rPr lang="en-US" dirty="0" smtClean="0"/>
+              <a:t>//Include a team development scenario and include a completed “Organizing Your Workflow” and “Workflow Recommendations” slides</a:t>
+            </a:r>
+            <a:endParaRPr lang="en-US" dirty="0"/>
+          </a:p>
+        </p:txBody>
+      </p:sp>
+      <p:sp>
+        <p:nvSpPr>
+          <p:cNvPr id="4" name="TextBox 3"/>
+          <p:cNvSpPr txBox="1"/>
+          <p:nvPr/>
+        </p:nvSpPr>
+        <p:spPr>
+          <a:xfrm>
+            <a:off x="152400" y="5562600"/>
+            <a:ext cx="8765477" cy="523220"/>
+          </a:xfrm>
+          <a:prstGeom prst="rect">
+            <a:avLst/>
+          </a:prstGeom>
+          <a:noFill/>
+        </p:spPr>
+        <p:txBody>
+          <a:bodyPr wrap="none" rtlCol="0">
+            <a:spAutoFit/>
+          </a:bodyPr>
+          <a:lstStyle/>
+          <a:p>
+            <a:r>
+              <a:rPr lang="en-US" sz="2800" dirty="0" smtClean="0"/>
+              <a:t>Discussion: </a:t>
+            </a:r>
+            <a:r>
+              <a:rPr lang="en-US" sz="2800" dirty="0" smtClean="0"/>
+              <a:t>What other use cases do you see arising?</a:t>
+            </a:r>
+            <a:endParaRPr lang="en-US" sz="2800" dirty="0"/>
+          </a:p>
+        </p:txBody>
+      </p:sp>
+    </p:spTree>
+  </p:cSld>
+  <p:clrMapOvr>
+    <a:masterClrMapping/>
+  </p:clrMapOvr>
+</p:sld>
+</file>
+
+<file path=ppt/slides/slide21.xml><?xml version="1.0" encoding="utf-8"?>
+<p:sld xmlns:a="http://schemas.openxmlformats.org/drawingml/2006/main" xmlns:r="http://schemas.openxmlformats.org/officeDocument/2006/relationships" xmlns:p="http://schemas.openxmlformats.org/presentationml/2006/main">
+  <p:cSld>
+    <p:spTree>
+      <p:nvGrpSpPr>
+        <p:cNvPr id="1" name=""/>
+        <p:cNvGrpSpPr/>
+        <p:nvPr/>
+      </p:nvGrpSpPr>
+      <p:grpSpPr>
+        <a:xfrm>
+          <a:off x="0" y="0"/>
+          <a:ext cx="0" cy="0"/>
+          <a:chOff x="0" y="0"/>
+          <a:chExt cx="0" cy="0"/>
+        </a:xfrm>
+      </p:grpSpPr>
+      <p:sp>
+        <p:nvSpPr>
+          <p:cNvPr id="2" name="Title 1"/>
+          <p:cNvSpPr>
+            <a:spLocks noGrp="1"/>
+          </p:cNvSpPr>
+          <p:nvPr>
+            <p:ph type="title"/>
+          </p:nvPr>
+        </p:nvSpPr>
+        <p:spPr/>
+        <p:txBody>
+          <a:bodyPr/>
+          <a:lstStyle/>
+          <a:p>
+            <a:r>
+              <a:rPr lang="en-US" dirty="0" smtClean="0"/>
+              <a:t>Tags in Source Code Control</a:t>
+            </a:r>
+            <a:endParaRPr lang="en-US" dirty="0"/>
+          </a:p>
+        </p:txBody>
+      </p:sp>
+      <p:sp>
+        <p:nvSpPr>
+          <p:cNvPr id="3" name="Content Placeholder 2"/>
+          <p:cNvSpPr>
+            <a:spLocks noGrp="1"/>
+          </p:cNvSpPr>
+          <p:nvPr>
+            <p:ph idx="1"/>
+          </p:nvPr>
+        </p:nvSpPr>
+        <p:spPr/>
+        <p:txBody>
+          <a:bodyPr/>
+          <a:lstStyle/>
+          <a:p>
+            <a:r>
+              <a:rPr lang="en-US" dirty="0" smtClean="0"/>
+              <a:t>//Include comments on how you use tags with source code control and LabVIEW</a:t>
+            </a:r>
+            <a:endParaRPr lang="en-US" dirty="0"/>
+          </a:p>
+        </p:txBody>
+      </p:sp>
+    </p:spTree>
+  </p:cSld>
+  <p:clrMapOvr>
+    <a:masterClrMapping/>
+  </p:clrMapOvr>
+  <p:timing>
+    <p:tnLst>
+      <p:par>
+        <p:cTn id="1" dur="indefinite" restart="never" nodeType="tmRoot"/>
+      </p:par>
+    </p:tnLst>
+  </p:timing>
+</p:sld>
+</file>
+
+<file path=ppt/slides/slide22.xml><?xml version="1.0" encoding="utf-8"?>
+<p:sld xmlns:a="http://schemas.openxmlformats.org/drawingml/2006/main" xmlns:r="http://schemas.openxmlformats.org/officeDocument/2006/relationships" xmlns:p="http://schemas.openxmlformats.org/presentationml/2006/main">
+  <p:cSld>
+    <p:spTree>
+      <p:nvGrpSpPr>
+        <p:cNvPr id="1" name=""/>
+        <p:cNvGrpSpPr/>
+        <p:nvPr/>
+      </p:nvGrpSpPr>
+      <p:grpSpPr>
+        <a:xfrm>
+          <a:off x="0" y="0"/>
+          <a:ext cx="0" cy="0"/>
+          <a:chOff x="0" y="0"/>
+          <a:chExt cx="0" cy="0"/>
+        </a:xfrm>
+      </p:grpSpPr>
+      <p:sp>
+        <p:nvSpPr>
+          <p:cNvPr id="2" name="Title 1"/>
+          <p:cNvSpPr>
+            <a:spLocks noGrp="1"/>
+          </p:cNvSpPr>
+          <p:nvPr>
+            <p:ph type="title"/>
+          </p:nvPr>
+        </p:nvSpPr>
+        <p:spPr/>
+        <p:txBody>
+          <a:bodyPr/>
+          <a:lstStyle/>
+          <a:p>
+            <a:r>
+              <a:rPr lang="en-US" dirty="0" smtClean="0"/>
+              <a:t>Files to include and exclude in SCC</a:t>
+            </a:r>
+            <a:endParaRPr lang="en-US" dirty="0"/>
+          </a:p>
+        </p:txBody>
+      </p:sp>
+      <p:sp>
+        <p:nvSpPr>
+          <p:cNvPr id="3" name="Content Placeholder 2"/>
+          <p:cNvSpPr>
+            <a:spLocks noGrp="1"/>
+          </p:cNvSpPr>
+          <p:nvPr>
+            <p:ph idx="1"/>
+          </p:nvPr>
+        </p:nvSpPr>
+        <p:spPr/>
+        <p:txBody>
+          <a:bodyPr/>
+          <a:lstStyle/>
+          <a:p>
+            <a:r>
+              <a:rPr lang="en-US" dirty="0" smtClean="0"/>
+              <a:t>//NOTE: This may or may not be helpful since there are </a:t>
+            </a:r>
+            <a:r>
+              <a:rPr lang="en-US" dirty="0" smtClean="0"/>
+              <a:t>many </a:t>
+            </a:r>
+            <a:r>
+              <a:rPr lang="en-US" dirty="0" smtClean="0"/>
+              <a:t>opinions about this. Added as a placeholder, but not sure how useful it would be.</a:t>
+            </a:r>
+            <a:endParaRPr lang="en-US" dirty="0"/>
+          </a:p>
+        </p:txBody>
+      </p:sp>
+    </p:spTree>
+  </p:cSld>
+  <p:clrMapOvr>
+    <a:masterClrMapping/>
+  </p:clrMapOvr>
+  <p:timing>
+    <p:tnLst>
+      <p:par>
+        <p:cTn id="1" dur="indefinite" restart="never" nodeType="tmRoot"/>
+      </p:par>
+    </p:tnLst>
+  </p:timing>
+</p:sld>
+</file>
+
+<file path=ppt/slides/slide23.xml><?xml version="1.0" encoding="utf-8"?>
+<p:sld xmlns:a="http://schemas.openxmlformats.org/drawingml/2006/main" xmlns:r="http://schemas.openxmlformats.org/officeDocument/2006/relationships" xmlns:p="http://schemas.openxmlformats.org/presentationml/2006/main">
+  <p:cSld>
+    <p:spTree>
+      <p:nvGrpSpPr>
+        <p:cNvPr id="1" name=""/>
+        <p:cNvGrpSpPr/>
+        <p:nvPr/>
+      </p:nvGrpSpPr>
+      <p:grpSpPr>
+        <a:xfrm>
+          <a:off x="0" y="0"/>
+          <a:ext cx="0" cy="0"/>
+          <a:chOff x="0" y="0"/>
+          <a:chExt cx="0" cy="0"/>
+        </a:xfrm>
+      </p:grpSpPr>
+      <p:sp>
+        <p:nvSpPr>
+          <p:cNvPr id="2" name="Title 1"/>
+          <p:cNvSpPr>
+            <a:spLocks noGrp="1"/>
+          </p:cNvSpPr>
+          <p:nvPr>
+            <p:ph type="title"/>
+          </p:nvPr>
+        </p:nvSpPr>
+        <p:spPr/>
+        <p:txBody>
+          <a:bodyPr/>
+          <a:lstStyle/>
+          <a:p>
+            <a:r>
+              <a:rPr lang="en-US" dirty="0" smtClean="0"/>
+              <a:t>Summary</a:t>
+            </a:r>
+            <a:endParaRPr lang="en-US" dirty="0"/>
+          </a:p>
+        </p:txBody>
+      </p:sp>
+      <p:sp>
+        <p:nvSpPr>
+          <p:cNvPr id="3" name="Content Placeholder 2"/>
+          <p:cNvSpPr>
+            <a:spLocks noGrp="1"/>
+          </p:cNvSpPr>
+          <p:nvPr>
+            <p:ph idx="1"/>
+          </p:nvPr>
+        </p:nvSpPr>
+        <p:spPr/>
+        <p:txBody>
+          <a:bodyPr/>
+          <a:lstStyle/>
+          <a:p>
+            <a:r>
+              <a:rPr lang="en-US" dirty="0" smtClean="0"/>
+              <a:t>//Provide a summary of recommendations for using LabVIEW with SCC</a:t>
+            </a:r>
+            <a:endParaRPr lang="en-US" dirty="0"/>
+          </a:p>
+        </p:txBody>
+      </p:sp>
+    </p:spTree>
+  </p:cSld>
+  <p:clrMapOvr>
+    <a:masterClrMapping/>
+  </p:clrMapOvr>
+</p:sld>
+</file>
+
+<file path=ppt/slides/slide24.xml><?xml version="1.0" encoding="utf-8"?>
 <p:sld xmlns:a="http://schemas.openxmlformats.org/drawingml/2006/main" xmlns:r="http://schemas.openxmlformats.org/officeDocument/2006/relationships" xmlns:p="http://schemas.openxmlformats.org/presentationml/2006/main">
   <p:cSld>
     <p:spTree>
@@ -16334,7 +16746,7 @@
     </p:spTree>
     <p:extLst>
       <p:ext uri="{BB962C8B-B14F-4D97-AF65-F5344CB8AC3E}">
-        <p14:creationId xmlns:p14="http://schemas.microsoft.com/office/powerpoint/2010/main" xmlns="" val="48945325"/>
+        <p14:creationId xmlns="" xmlns:p14="http://schemas.microsoft.com/office/powerpoint/2010/main" val="48945325"/>
       </p:ext>
     </p:extLst>
   </p:cSld>
@@ -17409,7 +17821,7 @@
     </p:spTree>
     <p:extLst>
       <p:ext uri="{BB962C8B-B14F-4D97-AF65-F5344CB8AC3E}">
-        <p14:creationId xmlns="" xmlns:p14="http://schemas.microsoft.com/office/powerpoint/2010/main" val="383238751"/>
+        <p14:creationId xmlns:p14="http://schemas.microsoft.com/office/powerpoint/2010/main" xmlns="" val="383238751"/>
       </p:ext>
     </p:extLst>
   </p:cSld>
@@ -17417,7 +17829,7 @@
     <a:masterClrMapping/>
   </p:clrMapOvr>
   <mc:AlternateContent xmlns:mc="http://schemas.openxmlformats.org/markup-compatibility/2006">
-    <mc:Choice xmlns="" xmlns:p14="http://schemas.microsoft.com/office/powerpoint/2010/main" Requires="p14">
+    <mc:Choice xmlns:p14="http://schemas.microsoft.com/office/powerpoint/2010/main" xmlns="" Requires="p14">
       <p:transition spd="slow" p14:dur="2000"/>
     </mc:Choice>
     <mc:Fallback>
@@ -18445,7 +18857,7 @@
     </p:spTree>
     <p:extLst>
       <p:ext uri="{BB962C8B-B14F-4D97-AF65-F5344CB8AC3E}">
-        <p14:creationId xmlns="" xmlns:p14="http://schemas.microsoft.com/office/powerpoint/2010/main" val="2625438082"/>
+        <p14:creationId xmlns:p14="http://schemas.microsoft.com/office/powerpoint/2010/main" xmlns="" val="2625438082"/>
       </p:ext>
     </p:extLst>
   </p:cSld>
@@ -18453,7 +18865,7 @@
     <a:masterClrMapping/>
   </p:clrMapOvr>
   <mc:AlternateContent xmlns:mc="http://schemas.openxmlformats.org/markup-compatibility/2006">
-    <mc:Choice xmlns="" xmlns:p14="http://schemas.microsoft.com/office/powerpoint/2010/main" Requires="p14">
+    <mc:Choice xmlns:p14="http://schemas.microsoft.com/office/powerpoint/2010/main" xmlns="" Requires="p14">
       <p:transition spd="slow" p14:dur="2000"/>
     </mc:Choice>
     <mc:Fallback>

</xml_diff>